<commit_message>
added ndvi measurements from the SR images to the 3 qgis projects and created a powerpoint summary
- modified the leaf toolbox script to output all surface reflectance bands with a 10m resolution
- replaced some of the timesteps or added new timesteps in each project with new surface reflectance tiffs that contain all the bands and cover a larger region that overlaps with both the reproduced and the original ndvi predictions
- added an ndvi layer for each of the new surface reflectance layers
- created a powerpoint summary of the comparisons between the reproduced ndvi predictions against the actual ndvi for all 3 sites
</commit_message>
<xml_diff>
--- a/development/greenearthnet/presentations/Site1.pptx
+++ b/development/greenearthnet/presentations/Site1.pptx
@@ -268,7 +268,7 @@
           <a:p>
             <a:fld id="{14D6D9EF-CE1C-4ACE-B43A-095A88614771}" type="datetimeFigureOut">
               <a:rPr lang="en-CA" smtClean="0"/>
-              <a:t>2025-10-07</a:t>
+              <a:t>2025-10-08</a:t>
             </a:fld>
             <a:endParaRPr lang="en-CA"/>
           </a:p>
@@ -468,7 +468,7 @@
           <a:p>
             <a:fld id="{14D6D9EF-CE1C-4ACE-B43A-095A88614771}" type="datetimeFigureOut">
               <a:rPr lang="en-CA" smtClean="0"/>
-              <a:t>2025-10-07</a:t>
+              <a:t>2025-10-08</a:t>
             </a:fld>
             <a:endParaRPr lang="en-CA"/>
           </a:p>
@@ -678,7 +678,7 @@
           <a:p>
             <a:fld id="{14D6D9EF-CE1C-4ACE-B43A-095A88614771}" type="datetimeFigureOut">
               <a:rPr lang="en-CA" smtClean="0"/>
-              <a:t>2025-10-07</a:t>
+              <a:t>2025-10-08</a:t>
             </a:fld>
             <a:endParaRPr lang="en-CA"/>
           </a:p>
@@ -878,7 +878,7 @@
           <a:p>
             <a:fld id="{14D6D9EF-CE1C-4ACE-B43A-095A88614771}" type="datetimeFigureOut">
               <a:rPr lang="en-CA" smtClean="0"/>
-              <a:t>2025-10-07</a:t>
+              <a:t>2025-10-08</a:t>
             </a:fld>
             <a:endParaRPr lang="en-CA"/>
           </a:p>
@@ -1154,7 +1154,7 @@
           <a:p>
             <a:fld id="{14D6D9EF-CE1C-4ACE-B43A-095A88614771}" type="datetimeFigureOut">
               <a:rPr lang="en-CA" smtClean="0"/>
-              <a:t>2025-10-07</a:t>
+              <a:t>2025-10-08</a:t>
             </a:fld>
             <a:endParaRPr lang="en-CA"/>
           </a:p>
@@ -1422,7 +1422,7 @@
           <a:p>
             <a:fld id="{14D6D9EF-CE1C-4ACE-B43A-095A88614771}" type="datetimeFigureOut">
               <a:rPr lang="en-CA" smtClean="0"/>
-              <a:t>2025-10-07</a:t>
+              <a:t>2025-10-08</a:t>
             </a:fld>
             <a:endParaRPr lang="en-CA"/>
           </a:p>
@@ -1837,7 +1837,7 @@
           <a:p>
             <a:fld id="{14D6D9EF-CE1C-4ACE-B43A-095A88614771}" type="datetimeFigureOut">
               <a:rPr lang="en-CA" smtClean="0"/>
-              <a:t>2025-10-07</a:t>
+              <a:t>2025-10-08</a:t>
             </a:fld>
             <a:endParaRPr lang="en-CA"/>
           </a:p>
@@ -1979,7 +1979,7 @@
           <a:p>
             <a:fld id="{14D6D9EF-CE1C-4ACE-B43A-095A88614771}" type="datetimeFigureOut">
               <a:rPr lang="en-CA" smtClean="0"/>
-              <a:t>2025-10-07</a:t>
+              <a:t>2025-10-08</a:t>
             </a:fld>
             <a:endParaRPr lang="en-CA"/>
           </a:p>
@@ -2092,7 +2092,7 @@
           <a:p>
             <a:fld id="{14D6D9EF-CE1C-4ACE-B43A-095A88614771}" type="datetimeFigureOut">
               <a:rPr lang="en-CA" smtClean="0"/>
-              <a:t>2025-10-07</a:t>
+              <a:t>2025-10-08</a:t>
             </a:fld>
             <a:endParaRPr lang="en-CA"/>
           </a:p>
@@ -2405,7 +2405,7 @@
           <a:p>
             <a:fld id="{14D6D9EF-CE1C-4ACE-B43A-095A88614771}" type="datetimeFigureOut">
               <a:rPr lang="en-CA" smtClean="0"/>
-              <a:t>2025-10-07</a:t>
+              <a:t>2025-10-08</a:t>
             </a:fld>
             <a:endParaRPr lang="en-CA"/>
           </a:p>
@@ -2694,7 +2694,7 @@
           <a:p>
             <a:fld id="{14D6D9EF-CE1C-4ACE-B43A-095A88614771}" type="datetimeFigureOut">
               <a:rPr lang="en-CA" smtClean="0"/>
-              <a:t>2025-10-07</a:t>
+              <a:t>2025-10-08</a:t>
             </a:fld>
             <a:endParaRPr lang="en-CA"/>
           </a:p>
@@ -2937,7 +2937,7 @@
           <a:p>
             <a:fld id="{14D6D9EF-CE1C-4ACE-B43A-095A88614771}" type="datetimeFigureOut">
               <a:rPr lang="en-CA" smtClean="0"/>
-              <a:t>2025-10-07</a:t>
+              <a:t>2025-10-08</a:t>
             </a:fld>
             <a:endParaRPr lang="en-CA"/>
           </a:p>
@@ -3030,6 +3030,56 @@
               <a:t>‹#›</a:t>
             </a:fld>
             <a:endParaRPr lang="en-CA"/>
+          </a:p>
+        </p:txBody>
+      </p:sp>
+      <p:sp>
+        <p:nvSpPr>
+          <p:cNvPr id="8" name="TextBox 7">
+            <a:extLst>
+              <a:ext uri="{FF2B5EF4-FFF2-40B4-BE49-F238E27FC236}">
+                <a16:creationId xmlns:a16="http://schemas.microsoft.com/office/drawing/2014/main" id="{E674669C-8A86-559B-202A-4F2901B7CC64}"/>
+              </a:ext>
+            </a:extLst>
+          </p:cNvPr>
+          <p:cNvSpPr txBox="1"/>
+          <p:nvPr userDrawn="1">
+            <p:extLst>
+              <p:ext uri="{1162E1C5-73C7-4A58-AE30-91384D911F3F}">
+                <p184:classification xmlns:p184="http://schemas.microsoft.com/office/powerpoint/2018/4/main" val="hdr"/>
+              </p:ext>
+            </p:extLst>
+          </p:nvPr>
+        </p:nvSpPr>
+        <p:spPr>
+          <a:xfrm>
+            <a:off x="10201275" y="63500"/>
+            <a:ext cx="1962150" cy="182880"/>
+          </a:xfrm>
+          <a:prstGeom prst="rect">
+            <a:avLst/>
+          </a:prstGeom>
+        </p:spPr>
+        <p:txBody>
+          <a:bodyPr horzOverflow="overflow" lIns="0" tIns="0" rIns="0" bIns="0">
+            <a:spAutoFit/>
+          </a:bodyPr>
+          <a:lstStyle/>
+          <a:p>
+            <a:pPr algn="l"/>
+            <a:r>
+              <a:rPr lang="en-CA" sz="1200">
+                <a:solidFill>
+                  <a:srgbClr val="000000">
+                    <a:alpha val="50000"/>
+                  </a:srgbClr>
+                </a:solidFill>
+                <a:latin typeface="Calibri" panose="020F0502020204030204" pitchFamily="34" charset="0"/>
+                <a:ea typeface="Calibri" panose="020F0502020204030204" pitchFamily="34" charset="0"/>
+                <a:cs typeface="Calibri" panose="020F0502020204030204" pitchFamily="34" charset="0"/>
+              </a:rPr>
+              <a:t>UNCLASSIFIED - NON CLASSIFIÉ</a:t>
+            </a:r>
           </a:p>
         </p:txBody>
       </p:sp>
@@ -4206,7 +4256,7 @@
         </p:blipFill>
         <p:spPr>
           <a:xfrm>
-            <a:off x="838200" y="1690688"/>
+            <a:off x="6367254" y="1690688"/>
             <a:ext cx="5706271" cy="3886742"/>
           </a:xfrm>
           <a:prstGeom prst="rect">
@@ -5772,4 +5822,10 @@
     </a:ext>
   </a:extLst>
 </a:theme>
+</file>
+
+<file path=docMetadata/LabelInfo.xml><?xml version="1.0" encoding="utf-8"?>
+<clbl:labelList xmlns:clbl="http://schemas.microsoft.com/office/2020/mipLabelMetadata">
+  <clbl:label id="{219619fd-75dc-48cb-820d-8f683a95dd8b}" enabled="1" method="Privileged" siteId="{05c95b33-90ca-49d5-b644-288b930b912b}" contentBits="1" removed="0"/>
+</clbl:labelList>
 </file>
</xml_diff>